<commit_message>
Web Program Flow Updated
home, login, oauth, dashboard, uploadOptions, upload, history, logout
</commit_message>
<xml_diff>
--- a/Documents/flow.pptx
+++ b/Documents/flow.pptx
@@ -5,40 +5,41 @@
     <p:sldMasterId id="2147483660" r:id="rId1"/>
   </p:sldMasterIdLst>
   <p:notesMasterIdLst>
-    <p:notesMasterId r:id="rId4"/>
+    <p:notesMasterId r:id="rId5"/>
   </p:notesMasterIdLst>
   <p:sldIdLst>
     <p:sldId id="1099" r:id="rId2"/>
     <p:sldId id="1100" r:id="rId3"/>
+    <p:sldId id="1101" r:id="rId4"/>
   </p:sldIdLst>
   <p:sldSz cx="9144000" cy="5143500" type="screen16x9"/>
   <p:notesSz cx="6858000" cy="9144000"/>
   <p:embeddedFontLst>
     <p:embeddedFont>
-      <p:font typeface="Muli Light" panose="020B0604020202020204" charset="0"/>
-      <p:regular r:id="rId5"/>
-      <p:bold r:id="rId6"/>
-      <p:italic r:id="rId7"/>
-      <p:boldItalic r:id="rId8"/>
+      <p:font typeface="Poppins" panose="020B0604020202020204" charset="0"/>
+      <p:regular r:id="rId6"/>
+      <p:bold r:id="rId7"/>
+      <p:italic r:id="rId8"/>
+      <p:boldItalic r:id="rId9"/>
     </p:embeddedFont>
     <p:embeddedFont>
       <p:font typeface="맑은 고딕" panose="020B0503020000020004" pitchFamily="50" charset="-127"/>
-      <p:regular r:id="rId9"/>
-      <p:bold r:id="rId10"/>
-    </p:embeddedFont>
-    <p:embeddedFont>
-      <p:font typeface="Poppins" panose="020B0604020202020204" charset="0"/>
-      <p:regular r:id="rId11"/>
-      <p:bold r:id="rId12"/>
-      <p:italic r:id="rId13"/>
-      <p:boldItalic r:id="rId14"/>
+      <p:regular r:id="rId10"/>
+      <p:bold r:id="rId11"/>
     </p:embeddedFont>
     <p:embeddedFont>
       <p:font typeface="Poppins Light" panose="020B0604020202020204" charset="0"/>
-      <p:regular r:id="rId15"/>
-      <p:bold r:id="rId16"/>
-      <p:italic r:id="rId17"/>
-      <p:boldItalic r:id="rId18"/>
+      <p:regular r:id="rId12"/>
+      <p:bold r:id="rId13"/>
+      <p:italic r:id="rId14"/>
+      <p:boldItalic r:id="rId15"/>
+    </p:embeddedFont>
+    <p:embeddedFont>
+      <p:font typeface="Muli Light" panose="020B0604020202020204" charset="0"/>
+      <p:regular r:id="rId16"/>
+      <p:bold r:id="rId17"/>
+      <p:italic r:id="rId18"/>
+      <p:boldItalic r:id="rId19"/>
     </p:embeddedFont>
   </p:embeddedFontLst>
   <p:defaultTextStyle>
@@ -272,7 +273,7 @@
   </p:defaultTextStyle>
   <p:extLst>
     <p:ext uri="{EFAFB233-063F-42B5-8137-9DF3F51BA10A}">
-      <p15:sldGuideLst xmlns:p15="http://schemas.microsoft.com/office/powerpoint/2012/main" xmlns="">
+      <p15:sldGuideLst xmlns="" xmlns:p15="http://schemas.microsoft.com/office/powerpoint/2012/main">
         <p15:guide id="1" orient="horz" pos="1620">
           <p15:clr>
             <a:srgbClr val="A4A3A4"/>
@@ -800,6 +801,72 @@
 </file>
 
 <file path=ppt/notesSlides/notesSlide2.xml><?xml version="1.0" encoding="utf-8"?>
+<p:notes xmlns:a="http://schemas.openxmlformats.org/drawingml/2006/main" xmlns:r="http://schemas.openxmlformats.org/officeDocument/2006/relationships" xmlns:p="http://schemas.openxmlformats.org/presentationml/2006/main">
+  <p:cSld>
+    <p:spTree>
+      <p:nvGrpSpPr>
+        <p:cNvPr id="1" name=""/>
+        <p:cNvGrpSpPr/>
+        <p:nvPr/>
+      </p:nvGrpSpPr>
+      <p:grpSpPr>
+        <a:xfrm>
+          <a:off x="0" y="0"/>
+          <a:ext cx="0" cy="0"/>
+          <a:chOff x="0" y="0"/>
+          <a:chExt cx="0" cy="0"/>
+        </a:xfrm>
+      </p:grpSpPr>
+      <p:sp>
+        <p:nvSpPr>
+          <p:cNvPr id="2" name="슬라이드 이미지 개체 틀 1"/>
+          <p:cNvSpPr>
+            <a:spLocks noGrp="1" noRot="1" noChangeAspect="1"/>
+          </p:cNvSpPr>
+          <p:nvPr>
+            <p:ph type="sldImg"/>
+          </p:nvPr>
+        </p:nvSpPr>
+        <p:spPr>
+          <a:xfrm>
+            <a:off x="381000" y="685800"/>
+            <a:ext cx="6096000" cy="3429000"/>
+          </a:xfrm>
+        </p:spPr>
+      </p:sp>
+      <p:sp>
+        <p:nvSpPr>
+          <p:cNvPr id="3" name="슬라이드 노트 개체 틀 2"/>
+          <p:cNvSpPr>
+            <a:spLocks noGrp="1"/>
+          </p:cNvSpPr>
+          <p:nvPr>
+            <p:ph type="body" idx="1"/>
+          </p:nvPr>
+        </p:nvSpPr>
+        <p:spPr/>
+        <p:txBody>
+          <a:bodyPr/>
+          <a:lstStyle/>
+          <a:p>
+            <a:endParaRPr lang="ko-KR" altLang="en-US" dirty="0"/>
+          </a:p>
+        </p:txBody>
+      </p:sp>
+    </p:spTree>
+    <p:extLst>
+      <p:ext uri="{BB962C8B-B14F-4D97-AF65-F5344CB8AC3E}">
+        <p14:creationId xmlns:p14="http://schemas.microsoft.com/office/powerpoint/2010/main" val="94538453"/>
+      </p:ext>
+    </p:extLst>
+  </p:cSld>
+  <p:clrMapOvr>
+    <a:masterClrMapping/>
+  </p:clrMapOvr>
+</p:notes>
+</file>
+
+<file path=ppt/notesSlides/notesSlide3.xml><?xml version="1.0" encoding="utf-8"?>
 <p:notes xmlns:a="http://schemas.openxmlformats.org/drawingml/2006/main" xmlns:r="http://schemas.openxmlformats.org/officeDocument/2006/relationships" xmlns:p="http://schemas.openxmlformats.org/presentationml/2006/main">
   <p:cSld>
     <p:spTree>
@@ -2378,7 +2445,7 @@
           <p:cNvPr id="2" name="슬라이드 번호 개체 틀 1">
             <a:extLst>
               <a:ext uri="{FF2B5EF4-FFF2-40B4-BE49-F238E27FC236}">
-                <a16:creationId xmlns:a16="http://schemas.microsoft.com/office/drawing/2014/main" xmlns="" id="{88BF840B-454A-44D5-914F-F085FD36D26E}"/>
+                <a16:creationId xmlns="" xmlns:a16="http://schemas.microsoft.com/office/drawing/2014/main" id="{88BF840B-454A-44D5-914F-F085FD36D26E}"/>
               </a:ext>
             </a:extLst>
           </p:cNvPr>
@@ -2416,7 +2483,7 @@
           <p:cNvPr id="4" name="텍스트 개체 틀 5">
             <a:extLst>
               <a:ext uri="{FF2B5EF4-FFF2-40B4-BE49-F238E27FC236}">
-                <a16:creationId xmlns:a16="http://schemas.microsoft.com/office/drawing/2014/main" xmlns="" id="{6A5813AE-A9EA-4AF5-9FCC-88A3BA5F60FE}"/>
+                <a16:creationId xmlns="" xmlns:a16="http://schemas.microsoft.com/office/drawing/2014/main" id="{6A5813AE-A9EA-4AF5-9FCC-88A3BA5F60FE}"/>
               </a:ext>
             </a:extLst>
           </p:cNvPr>
@@ -2694,7 +2761,7 @@
           <p:cNvPr id="6" name="Google Shape;70;p15">
             <a:extLst>
               <a:ext uri="{FF2B5EF4-FFF2-40B4-BE49-F238E27FC236}">
-                <a16:creationId xmlns:a16="http://schemas.microsoft.com/office/drawing/2014/main" xmlns="" id="{022CF9C6-6C62-47DC-8C7E-70C37F4A7BF3}"/>
+                <a16:creationId xmlns="" xmlns:a16="http://schemas.microsoft.com/office/drawing/2014/main" id="{022CF9C6-6C62-47DC-8C7E-70C37F4A7BF3}"/>
               </a:ext>
             </a:extLst>
           </p:cNvPr>
@@ -4583,7 +4650,7 @@
           <p:cNvPr id="2" name="슬라이드 번호 개체 틀 1">
             <a:extLst>
               <a:ext uri="{FF2B5EF4-FFF2-40B4-BE49-F238E27FC236}">
-                <a16:creationId xmlns:a16="http://schemas.microsoft.com/office/drawing/2014/main" xmlns="" id="{88BF840B-454A-44D5-914F-F085FD36D26E}"/>
+                <a16:creationId xmlns="" xmlns:a16="http://schemas.microsoft.com/office/drawing/2014/main" id="{88BF840B-454A-44D5-914F-F085FD36D26E}"/>
               </a:ext>
             </a:extLst>
           </p:cNvPr>
@@ -4621,7 +4688,7 @@
           <p:cNvPr id="4" name="텍스트 개체 틀 5">
             <a:extLst>
               <a:ext uri="{FF2B5EF4-FFF2-40B4-BE49-F238E27FC236}">
-                <a16:creationId xmlns:a16="http://schemas.microsoft.com/office/drawing/2014/main" xmlns="" id="{6A5813AE-A9EA-4AF5-9FCC-88A3BA5F60FE}"/>
+                <a16:creationId xmlns="" xmlns:a16="http://schemas.microsoft.com/office/drawing/2014/main" id="{6A5813AE-A9EA-4AF5-9FCC-88A3BA5F60FE}"/>
               </a:ext>
             </a:extLst>
           </p:cNvPr>
@@ -4899,7 +4966,7 @@
           <p:cNvPr id="6" name="Google Shape;70;p15">
             <a:extLst>
               <a:ext uri="{FF2B5EF4-FFF2-40B4-BE49-F238E27FC236}">
-                <a16:creationId xmlns:a16="http://schemas.microsoft.com/office/drawing/2014/main" xmlns="" id="{022CF9C6-6C62-47DC-8C7E-70C37F4A7BF3}"/>
+                <a16:creationId xmlns="" xmlns:a16="http://schemas.microsoft.com/office/drawing/2014/main" id="{022CF9C6-6C62-47DC-8C7E-70C37F4A7BF3}"/>
               </a:ext>
             </a:extLst>
           </p:cNvPr>
@@ -5949,23 +6016,7 @@
                       </a:outerShdw>
                     </a:effectLst>
                   </a:rPr>
-                  <a:t>upload</a:t>
-                </a:r>
-                <a:r>
-                  <a:rPr lang="en-US" altLang="ko-KR" dirty="0" smtClean="0">
-                    <a:ln w="0"/>
-                    <a:solidFill>
-                      <a:schemeClr val="tx1"/>
-                    </a:solidFill>
-                    <a:effectLst>
-                      <a:outerShdw blurRad="38100" dist="19050" dir="2700000" algn="tl" rotWithShape="0">
-                        <a:schemeClr val="dk1">
-                          <a:alpha val="40000"/>
-                        </a:schemeClr>
-                      </a:outerShdw>
-                    </a:effectLst>
-                  </a:rPr>
-                  <a:t>()</a:t>
+                  <a:t>upload()</a:t>
                 </a:r>
                 <a:endParaRPr lang="ko-KR" altLang="en-US" dirty="0">
                   <a:ln w="0"/>
@@ -6666,6 +6717,1370 @@
     <p:extLst>
       <p:ext uri="{BB962C8B-B14F-4D97-AF65-F5344CB8AC3E}">
         <p14:creationId xmlns:p14="http://schemas.microsoft.com/office/powerpoint/2010/main" val="1247580059"/>
+      </p:ext>
+    </p:extLst>
+  </p:cSld>
+  <p:clrMapOvr>
+    <a:masterClrMapping/>
+  </p:clrMapOvr>
+  <p:timing>
+    <p:tnLst>
+      <p:par>
+        <p:cTn id="1" dur="indefinite" restart="never" nodeType="tmRoot"/>
+      </p:par>
+    </p:tnLst>
+  </p:timing>
+</p:sld>
+</file>
+
+<file path=ppt/slides/slide3.xml><?xml version="1.0" encoding="utf-8"?>
+<p:sld xmlns:a="http://schemas.openxmlformats.org/drawingml/2006/main" xmlns:r="http://schemas.openxmlformats.org/officeDocument/2006/relationships" xmlns:p="http://schemas.openxmlformats.org/presentationml/2006/main">
+  <p:cSld>
+    <p:spTree>
+      <p:nvGrpSpPr>
+        <p:cNvPr id="1" name=""/>
+        <p:cNvGrpSpPr/>
+        <p:nvPr/>
+      </p:nvGrpSpPr>
+      <p:grpSpPr>
+        <a:xfrm>
+          <a:off x="0" y="0"/>
+          <a:ext cx="0" cy="0"/>
+          <a:chOff x="0" y="0"/>
+          <a:chExt cx="0" cy="0"/>
+        </a:xfrm>
+      </p:grpSpPr>
+      <p:sp>
+        <p:nvSpPr>
+          <p:cNvPr id="2" name="슬라이드 번호 개체 틀 1">
+            <a:extLst>
+              <a:ext uri="{FF2B5EF4-FFF2-40B4-BE49-F238E27FC236}">
+                <a16:creationId xmlns="" xmlns:a16="http://schemas.microsoft.com/office/drawing/2014/main" id="{88BF840B-454A-44D5-914F-F085FD36D26E}"/>
+              </a:ext>
+            </a:extLst>
+          </p:cNvPr>
+          <p:cNvSpPr>
+            <a:spLocks noGrp="1"/>
+          </p:cNvSpPr>
+          <p:nvPr>
+            <p:ph type="sldNum" idx="12"/>
+          </p:nvPr>
+        </p:nvSpPr>
+        <p:spPr/>
+        <p:txBody>
+          <a:bodyPr/>
+          <a:lstStyle/>
+          <a:p>
+            <a:pPr marL="0" lvl="0" indent="0" algn="r" rtl="0">
+              <a:spcBef>
+                <a:spcPts val="0"/>
+              </a:spcBef>
+              <a:spcAft>
+                <a:spcPts val="0"/>
+              </a:spcAft>
+              <a:buNone/>
+            </a:pPr>
+            <a:fld id="{00000000-1234-1234-1234-123412341234}" type="slidenum">
+              <a:rPr lang="en" smtClean="0"/>
+              <a:t>3</a:t>
+            </a:fld>
+            <a:endParaRPr lang="en"/>
+          </a:p>
+        </p:txBody>
+      </p:sp>
+      <p:sp>
+        <p:nvSpPr>
+          <p:cNvPr id="4" name="텍스트 개체 틀 5">
+            <a:extLst>
+              <a:ext uri="{FF2B5EF4-FFF2-40B4-BE49-F238E27FC236}">
+                <a16:creationId xmlns="" xmlns:a16="http://schemas.microsoft.com/office/drawing/2014/main" id="{6A5813AE-A9EA-4AF5-9FCC-88A3BA5F60FE}"/>
+              </a:ext>
+            </a:extLst>
+          </p:cNvPr>
+          <p:cNvSpPr txBox="1">
+            <a:spLocks/>
+          </p:cNvSpPr>
+          <p:nvPr/>
+        </p:nvSpPr>
+        <p:spPr>
+          <a:xfrm>
+            <a:off x="6642847" y="568728"/>
+            <a:ext cx="2501153" cy="480143"/>
+          </a:xfrm>
+          <a:prstGeom prst="rect">
+            <a:avLst/>
+          </a:prstGeom>
+        </p:spPr>
+        <p:txBody>
+          <a:bodyPr/>
+          <a:lstStyle>
+            <a:defPPr marR="0" lvl="0" algn="l" rtl="0">
+              <a:lnSpc>
+                <a:spcPct val="100000"/>
+              </a:lnSpc>
+              <a:spcBef>
+                <a:spcPts val="0"/>
+              </a:spcBef>
+              <a:spcAft>
+                <a:spcPts val="0"/>
+              </a:spcAft>
+            </a:defPPr>
+            <a:lvl1pPr marR="0" lvl="0" algn="l" rtl="0">
+              <a:lnSpc>
+                <a:spcPct val="100000"/>
+              </a:lnSpc>
+              <a:spcBef>
+                <a:spcPts val="0"/>
+              </a:spcBef>
+              <a:spcAft>
+                <a:spcPts val="0"/>
+              </a:spcAft>
+              <a:buClr>
+                <a:srgbClr val="000000"/>
+              </a:buClr>
+              <a:buFont typeface="Arial"/>
+              <a:defRPr sz="1400" b="0" i="0" u="none" strike="noStrike" cap="none">
+                <a:solidFill>
+                  <a:srgbClr val="000000"/>
+                </a:solidFill>
+                <a:latin typeface="Arial"/>
+                <a:ea typeface="Arial"/>
+                <a:cs typeface="Arial"/>
+                <a:sym typeface="Arial"/>
+              </a:defRPr>
+            </a:lvl1pPr>
+            <a:lvl2pPr marR="0" lvl="1" algn="l" rtl="0">
+              <a:lnSpc>
+                <a:spcPct val="100000"/>
+              </a:lnSpc>
+              <a:spcBef>
+                <a:spcPts val="0"/>
+              </a:spcBef>
+              <a:spcAft>
+                <a:spcPts val="0"/>
+              </a:spcAft>
+              <a:buClr>
+                <a:srgbClr val="000000"/>
+              </a:buClr>
+              <a:buFont typeface="Arial"/>
+              <a:defRPr sz="1400" b="0" i="0" u="none" strike="noStrike" cap="none">
+                <a:solidFill>
+                  <a:srgbClr val="000000"/>
+                </a:solidFill>
+                <a:latin typeface="Arial"/>
+                <a:ea typeface="Arial"/>
+                <a:cs typeface="Arial"/>
+                <a:sym typeface="Arial"/>
+              </a:defRPr>
+            </a:lvl2pPr>
+            <a:lvl3pPr marR="0" lvl="2" algn="l" rtl="0">
+              <a:lnSpc>
+                <a:spcPct val="100000"/>
+              </a:lnSpc>
+              <a:spcBef>
+                <a:spcPts val="0"/>
+              </a:spcBef>
+              <a:spcAft>
+                <a:spcPts val="0"/>
+              </a:spcAft>
+              <a:buClr>
+                <a:srgbClr val="000000"/>
+              </a:buClr>
+              <a:buFont typeface="Arial"/>
+              <a:defRPr sz="1400" b="0" i="0" u="none" strike="noStrike" cap="none">
+                <a:solidFill>
+                  <a:srgbClr val="000000"/>
+                </a:solidFill>
+                <a:latin typeface="Arial"/>
+                <a:ea typeface="Arial"/>
+                <a:cs typeface="Arial"/>
+                <a:sym typeface="Arial"/>
+              </a:defRPr>
+            </a:lvl3pPr>
+            <a:lvl4pPr marR="0" lvl="3" algn="l" rtl="0">
+              <a:lnSpc>
+                <a:spcPct val="100000"/>
+              </a:lnSpc>
+              <a:spcBef>
+                <a:spcPts val="0"/>
+              </a:spcBef>
+              <a:spcAft>
+                <a:spcPts val="0"/>
+              </a:spcAft>
+              <a:buClr>
+                <a:srgbClr val="000000"/>
+              </a:buClr>
+              <a:buFont typeface="Arial"/>
+              <a:defRPr sz="1400" b="0" i="0" u="none" strike="noStrike" cap="none">
+                <a:solidFill>
+                  <a:srgbClr val="000000"/>
+                </a:solidFill>
+                <a:latin typeface="Arial"/>
+                <a:ea typeface="Arial"/>
+                <a:cs typeface="Arial"/>
+                <a:sym typeface="Arial"/>
+              </a:defRPr>
+            </a:lvl4pPr>
+            <a:lvl5pPr marR="0" lvl="4" algn="l" rtl="0">
+              <a:lnSpc>
+                <a:spcPct val="100000"/>
+              </a:lnSpc>
+              <a:spcBef>
+                <a:spcPts val="0"/>
+              </a:spcBef>
+              <a:spcAft>
+                <a:spcPts val="0"/>
+              </a:spcAft>
+              <a:buClr>
+                <a:srgbClr val="000000"/>
+              </a:buClr>
+              <a:buFont typeface="Arial"/>
+              <a:defRPr sz="1400" b="0" i="0" u="none" strike="noStrike" cap="none">
+                <a:solidFill>
+                  <a:srgbClr val="000000"/>
+                </a:solidFill>
+                <a:latin typeface="Arial"/>
+                <a:ea typeface="Arial"/>
+                <a:cs typeface="Arial"/>
+                <a:sym typeface="Arial"/>
+              </a:defRPr>
+            </a:lvl5pPr>
+            <a:lvl6pPr marR="0" lvl="5" algn="l" rtl="0">
+              <a:lnSpc>
+                <a:spcPct val="100000"/>
+              </a:lnSpc>
+              <a:spcBef>
+                <a:spcPts val="0"/>
+              </a:spcBef>
+              <a:spcAft>
+                <a:spcPts val="0"/>
+              </a:spcAft>
+              <a:buClr>
+                <a:srgbClr val="000000"/>
+              </a:buClr>
+              <a:buFont typeface="Arial"/>
+              <a:defRPr sz="1400" b="0" i="0" u="none" strike="noStrike" cap="none">
+                <a:solidFill>
+                  <a:srgbClr val="000000"/>
+                </a:solidFill>
+                <a:latin typeface="Arial"/>
+                <a:ea typeface="Arial"/>
+                <a:cs typeface="Arial"/>
+                <a:sym typeface="Arial"/>
+              </a:defRPr>
+            </a:lvl6pPr>
+            <a:lvl7pPr marR="0" lvl="6" algn="l" rtl="0">
+              <a:lnSpc>
+                <a:spcPct val="100000"/>
+              </a:lnSpc>
+              <a:spcBef>
+                <a:spcPts val="0"/>
+              </a:spcBef>
+              <a:spcAft>
+                <a:spcPts val="0"/>
+              </a:spcAft>
+              <a:buClr>
+                <a:srgbClr val="000000"/>
+              </a:buClr>
+              <a:buFont typeface="Arial"/>
+              <a:defRPr sz="1400" b="0" i="0" u="none" strike="noStrike" cap="none">
+                <a:solidFill>
+                  <a:srgbClr val="000000"/>
+                </a:solidFill>
+                <a:latin typeface="Arial"/>
+                <a:ea typeface="Arial"/>
+                <a:cs typeface="Arial"/>
+                <a:sym typeface="Arial"/>
+              </a:defRPr>
+            </a:lvl7pPr>
+            <a:lvl8pPr marR="0" lvl="7" algn="l" rtl="0">
+              <a:lnSpc>
+                <a:spcPct val="100000"/>
+              </a:lnSpc>
+              <a:spcBef>
+                <a:spcPts val="0"/>
+              </a:spcBef>
+              <a:spcAft>
+                <a:spcPts val="0"/>
+              </a:spcAft>
+              <a:buClr>
+                <a:srgbClr val="000000"/>
+              </a:buClr>
+              <a:buFont typeface="Arial"/>
+              <a:defRPr sz="1400" b="0" i="0" u="none" strike="noStrike" cap="none">
+                <a:solidFill>
+                  <a:srgbClr val="000000"/>
+                </a:solidFill>
+                <a:latin typeface="Arial"/>
+                <a:ea typeface="Arial"/>
+                <a:cs typeface="Arial"/>
+                <a:sym typeface="Arial"/>
+              </a:defRPr>
+            </a:lvl8pPr>
+            <a:lvl9pPr marR="0" lvl="8" algn="l" rtl="0">
+              <a:lnSpc>
+                <a:spcPct val="100000"/>
+              </a:lnSpc>
+              <a:spcBef>
+                <a:spcPts val="0"/>
+              </a:spcBef>
+              <a:spcAft>
+                <a:spcPts val="0"/>
+              </a:spcAft>
+              <a:buClr>
+                <a:srgbClr val="000000"/>
+              </a:buClr>
+              <a:buFont typeface="Arial"/>
+              <a:defRPr sz="1400" b="0" i="0" u="none" strike="noStrike" cap="none">
+                <a:solidFill>
+                  <a:srgbClr val="000000"/>
+                </a:solidFill>
+                <a:latin typeface="Arial"/>
+                <a:ea typeface="Arial"/>
+                <a:cs typeface="Arial"/>
+                <a:sym typeface="Arial"/>
+              </a:defRPr>
+            </a:lvl9pPr>
+          </a:lstStyle>
+          <a:p>
+            <a:r>
+              <a:rPr lang="en-US" altLang="ko-KR" sz="2000" dirty="0" smtClean="0">
+                <a:latin typeface="Muli Light" panose="020B0600000101010101" charset="0"/>
+                <a:cs typeface="Arial" panose="020B0604020202020204" pitchFamily="34" charset="0"/>
+              </a:rPr>
+              <a:t>Process Flow</a:t>
+            </a:r>
+          </a:p>
+          <a:p>
+            <a:r>
+              <a:rPr lang="en-US" altLang="ko-KR" sz="2000" dirty="0" smtClean="0">
+                <a:latin typeface="Muli Light" panose="020B0600000101010101" charset="0"/>
+                <a:cs typeface="Arial" panose="020B0604020202020204" pitchFamily="34" charset="0"/>
+              </a:rPr>
+              <a:t>Design</a:t>
+            </a:r>
+            <a:endParaRPr lang="en-US" altLang="ko-KR" sz="2000" dirty="0">
+              <a:latin typeface="Muli Light" panose="020B0600000101010101" charset="0"/>
+              <a:cs typeface="Arial" panose="020B0604020202020204" pitchFamily="34" charset="0"/>
+            </a:endParaRPr>
+          </a:p>
+        </p:txBody>
+      </p:sp>
+      <p:sp>
+        <p:nvSpPr>
+          <p:cNvPr id="6" name="Google Shape;70;p15">
+            <a:extLst>
+              <a:ext uri="{FF2B5EF4-FFF2-40B4-BE49-F238E27FC236}">
+                <a16:creationId xmlns="" xmlns:a16="http://schemas.microsoft.com/office/drawing/2014/main" id="{022CF9C6-6C62-47DC-8C7E-70C37F4A7BF3}"/>
+              </a:ext>
+            </a:extLst>
+          </p:cNvPr>
+          <p:cNvSpPr txBox="1">
+            <a:spLocks/>
+          </p:cNvSpPr>
+          <p:nvPr/>
+        </p:nvSpPr>
+        <p:spPr>
+          <a:xfrm>
+            <a:off x="161364" y="52688"/>
+            <a:ext cx="6300300" cy="857400"/>
+          </a:xfrm>
+          <a:prstGeom prst="rect">
+            <a:avLst/>
+          </a:prstGeom>
+        </p:spPr>
+        <p:txBody>
+          <a:bodyPr spcFirstLastPara="1" wrap="square" lIns="0" tIns="0" rIns="0" bIns="0" anchor="b" anchorCtr="0">
+            <a:noAutofit/>
+          </a:bodyPr>
+          <a:lstStyle>
+            <a:defPPr marR="0" lvl="0" algn="l" rtl="0">
+              <a:lnSpc>
+                <a:spcPct val="100000"/>
+              </a:lnSpc>
+              <a:spcBef>
+                <a:spcPts val="0"/>
+              </a:spcBef>
+              <a:spcAft>
+                <a:spcPts val="0"/>
+              </a:spcAft>
+            </a:defPPr>
+            <a:lvl1pPr marR="0" lvl="0" algn="l" rtl="0">
+              <a:lnSpc>
+                <a:spcPct val="100000"/>
+              </a:lnSpc>
+              <a:spcBef>
+                <a:spcPts val="0"/>
+              </a:spcBef>
+              <a:spcAft>
+                <a:spcPts val="0"/>
+              </a:spcAft>
+              <a:buClr>
+                <a:srgbClr val="000000"/>
+              </a:buClr>
+              <a:buFont typeface="Arial"/>
+              <a:defRPr sz="1400" b="0" i="0" u="none" strike="noStrike" cap="none">
+                <a:solidFill>
+                  <a:srgbClr val="000000"/>
+                </a:solidFill>
+                <a:latin typeface="Arial"/>
+                <a:ea typeface="Arial"/>
+                <a:cs typeface="Arial"/>
+                <a:sym typeface="Arial"/>
+              </a:defRPr>
+            </a:lvl1pPr>
+            <a:lvl2pPr marR="0" lvl="1" algn="l" rtl="0">
+              <a:lnSpc>
+                <a:spcPct val="100000"/>
+              </a:lnSpc>
+              <a:spcBef>
+                <a:spcPts val="0"/>
+              </a:spcBef>
+              <a:spcAft>
+                <a:spcPts val="0"/>
+              </a:spcAft>
+              <a:buClr>
+                <a:srgbClr val="000000"/>
+              </a:buClr>
+              <a:buFont typeface="Arial"/>
+              <a:defRPr sz="1400" b="0" i="0" u="none" strike="noStrike" cap="none">
+                <a:solidFill>
+                  <a:srgbClr val="000000"/>
+                </a:solidFill>
+                <a:latin typeface="Arial"/>
+                <a:ea typeface="Arial"/>
+                <a:cs typeface="Arial"/>
+                <a:sym typeface="Arial"/>
+              </a:defRPr>
+            </a:lvl2pPr>
+            <a:lvl3pPr marR="0" lvl="2" algn="l" rtl="0">
+              <a:lnSpc>
+                <a:spcPct val="100000"/>
+              </a:lnSpc>
+              <a:spcBef>
+                <a:spcPts val="0"/>
+              </a:spcBef>
+              <a:spcAft>
+                <a:spcPts val="0"/>
+              </a:spcAft>
+              <a:buClr>
+                <a:srgbClr val="000000"/>
+              </a:buClr>
+              <a:buFont typeface="Arial"/>
+              <a:defRPr sz="1400" b="0" i="0" u="none" strike="noStrike" cap="none">
+                <a:solidFill>
+                  <a:srgbClr val="000000"/>
+                </a:solidFill>
+                <a:latin typeface="Arial"/>
+                <a:ea typeface="Arial"/>
+                <a:cs typeface="Arial"/>
+                <a:sym typeface="Arial"/>
+              </a:defRPr>
+            </a:lvl3pPr>
+            <a:lvl4pPr marR="0" lvl="3" algn="l" rtl="0">
+              <a:lnSpc>
+                <a:spcPct val="100000"/>
+              </a:lnSpc>
+              <a:spcBef>
+                <a:spcPts val="0"/>
+              </a:spcBef>
+              <a:spcAft>
+                <a:spcPts val="0"/>
+              </a:spcAft>
+              <a:buClr>
+                <a:srgbClr val="000000"/>
+              </a:buClr>
+              <a:buFont typeface="Arial"/>
+              <a:defRPr sz="1400" b="0" i="0" u="none" strike="noStrike" cap="none">
+                <a:solidFill>
+                  <a:srgbClr val="000000"/>
+                </a:solidFill>
+                <a:latin typeface="Arial"/>
+                <a:ea typeface="Arial"/>
+                <a:cs typeface="Arial"/>
+                <a:sym typeface="Arial"/>
+              </a:defRPr>
+            </a:lvl4pPr>
+            <a:lvl5pPr marR="0" lvl="4" algn="l" rtl="0">
+              <a:lnSpc>
+                <a:spcPct val="100000"/>
+              </a:lnSpc>
+              <a:spcBef>
+                <a:spcPts val="0"/>
+              </a:spcBef>
+              <a:spcAft>
+                <a:spcPts val="0"/>
+              </a:spcAft>
+              <a:buClr>
+                <a:srgbClr val="000000"/>
+              </a:buClr>
+              <a:buFont typeface="Arial"/>
+              <a:defRPr sz="1400" b="0" i="0" u="none" strike="noStrike" cap="none">
+                <a:solidFill>
+                  <a:srgbClr val="000000"/>
+                </a:solidFill>
+                <a:latin typeface="Arial"/>
+                <a:ea typeface="Arial"/>
+                <a:cs typeface="Arial"/>
+                <a:sym typeface="Arial"/>
+              </a:defRPr>
+            </a:lvl5pPr>
+            <a:lvl6pPr marR="0" lvl="5" algn="l" rtl="0">
+              <a:lnSpc>
+                <a:spcPct val="100000"/>
+              </a:lnSpc>
+              <a:spcBef>
+                <a:spcPts val="0"/>
+              </a:spcBef>
+              <a:spcAft>
+                <a:spcPts val="0"/>
+              </a:spcAft>
+              <a:buClr>
+                <a:srgbClr val="000000"/>
+              </a:buClr>
+              <a:buFont typeface="Arial"/>
+              <a:defRPr sz="1400" b="0" i="0" u="none" strike="noStrike" cap="none">
+                <a:solidFill>
+                  <a:srgbClr val="000000"/>
+                </a:solidFill>
+                <a:latin typeface="Arial"/>
+                <a:ea typeface="Arial"/>
+                <a:cs typeface="Arial"/>
+                <a:sym typeface="Arial"/>
+              </a:defRPr>
+            </a:lvl6pPr>
+            <a:lvl7pPr marR="0" lvl="6" algn="l" rtl="0">
+              <a:lnSpc>
+                <a:spcPct val="100000"/>
+              </a:lnSpc>
+              <a:spcBef>
+                <a:spcPts val="0"/>
+              </a:spcBef>
+              <a:spcAft>
+                <a:spcPts val="0"/>
+              </a:spcAft>
+              <a:buClr>
+                <a:srgbClr val="000000"/>
+              </a:buClr>
+              <a:buFont typeface="Arial"/>
+              <a:defRPr sz="1400" b="0" i="0" u="none" strike="noStrike" cap="none">
+                <a:solidFill>
+                  <a:srgbClr val="000000"/>
+                </a:solidFill>
+                <a:latin typeface="Arial"/>
+                <a:ea typeface="Arial"/>
+                <a:cs typeface="Arial"/>
+                <a:sym typeface="Arial"/>
+              </a:defRPr>
+            </a:lvl7pPr>
+            <a:lvl8pPr marR="0" lvl="7" algn="l" rtl="0">
+              <a:lnSpc>
+                <a:spcPct val="100000"/>
+              </a:lnSpc>
+              <a:spcBef>
+                <a:spcPts val="0"/>
+              </a:spcBef>
+              <a:spcAft>
+                <a:spcPts val="0"/>
+              </a:spcAft>
+              <a:buClr>
+                <a:srgbClr val="000000"/>
+              </a:buClr>
+              <a:buFont typeface="Arial"/>
+              <a:defRPr sz="1400" b="0" i="0" u="none" strike="noStrike" cap="none">
+                <a:solidFill>
+                  <a:srgbClr val="000000"/>
+                </a:solidFill>
+                <a:latin typeface="Arial"/>
+                <a:ea typeface="Arial"/>
+                <a:cs typeface="Arial"/>
+                <a:sym typeface="Arial"/>
+              </a:defRPr>
+            </a:lvl8pPr>
+            <a:lvl9pPr marR="0" lvl="8" algn="l" rtl="0">
+              <a:lnSpc>
+                <a:spcPct val="100000"/>
+              </a:lnSpc>
+              <a:spcBef>
+                <a:spcPts val="0"/>
+              </a:spcBef>
+              <a:spcAft>
+                <a:spcPts val="0"/>
+              </a:spcAft>
+              <a:buClr>
+                <a:srgbClr val="000000"/>
+              </a:buClr>
+              <a:buFont typeface="Arial"/>
+              <a:defRPr sz="1400" b="0" i="0" u="none" strike="noStrike" cap="none">
+                <a:solidFill>
+                  <a:srgbClr val="000000"/>
+                </a:solidFill>
+                <a:latin typeface="Arial"/>
+                <a:ea typeface="Arial"/>
+                <a:cs typeface="Arial"/>
+                <a:sym typeface="Arial"/>
+              </a:defRPr>
+            </a:lvl9pPr>
+          </a:lstStyle>
+          <a:p>
+            <a:r>
+              <a:rPr lang="en-US" sz="4800" dirty="0">
+                <a:solidFill>
+                  <a:srgbClr val="305178"/>
+                </a:solidFill>
+                <a:latin typeface="Poppins" panose="020B0600000101010101" charset="0"/>
+                <a:cs typeface="Poppins" panose="020B0600000101010101" charset="0"/>
+              </a:rPr>
+              <a:t>5</a:t>
+            </a:r>
+            <a:r>
+              <a:rPr lang="en-US" sz="4800" baseline="30000" dirty="0" smtClean="0">
+                <a:solidFill>
+                  <a:srgbClr val="305178"/>
+                </a:solidFill>
+                <a:latin typeface="Poppins" panose="020B0600000101010101" charset="0"/>
+                <a:cs typeface="Poppins" panose="020B0600000101010101" charset="0"/>
+              </a:rPr>
+              <a:t>th</a:t>
+            </a:r>
+            <a:r>
+              <a:rPr lang="en-US" sz="4800" dirty="0" smtClean="0">
+                <a:solidFill>
+                  <a:srgbClr val="305178"/>
+                </a:solidFill>
+                <a:latin typeface="Poppins" panose="020B0600000101010101" charset="0"/>
+                <a:cs typeface="Poppins" panose="020B0600000101010101" charset="0"/>
+              </a:rPr>
+              <a:t> </a:t>
+            </a:r>
+            <a:r>
+              <a:rPr lang="en-US" sz="4800" dirty="0">
+                <a:solidFill>
+                  <a:srgbClr val="305178"/>
+                </a:solidFill>
+                <a:latin typeface="Poppins" panose="020B0600000101010101" charset="0"/>
+                <a:cs typeface="Poppins" panose="020B0600000101010101" charset="0"/>
+              </a:rPr>
+              <a:t>week’s progress</a:t>
+            </a:r>
+          </a:p>
+        </p:txBody>
+      </p:sp>
+      <p:sp>
+        <p:nvSpPr>
+          <p:cNvPr id="3" name="모서리가 둥근 직사각형 2"/>
+          <p:cNvSpPr/>
+          <p:nvPr/>
+        </p:nvSpPr>
+        <p:spPr>
+          <a:xfrm>
+            <a:off x="803082" y="1232449"/>
+            <a:ext cx="874643" cy="461175"/>
+          </a:xfrm>
+          <a:prstGeom prst="roundRect">
+            <a:avLst/>
+          </a:prstGeom>
+        </p:spPr>
+        <p:style>
+          <a:lnRef idx="2">
+            <a:schemeClr val="accent1">
+              <a:shade val="50000"/>
+            </a:schemeClr>
+          </a:lnRef>
+          <a:fillRef idx="1">
+            <a:schemeClr val="accent1"/>
+          </a:fillRef>
+          <a:effectRef idx="0">
+            <a:schemeClr val="accent1"/>
+          </a:effectRef>
+          <a:fontRef idx="minor">
+            <a:schemeClr val="lt1"/>
+          </a:fontRef>
+        </p:style>
+        <p:txBody>
+          <a:bodyPr rtlCol="0" anchor="ctr"/>
+          <a:lstStyle/>
+          <a:p>
+            <a:pPr algn="ctr"/>
+            <a:r>
+              <a:rPr lang="en-US" altLang="ko-KR" dirty="0" smtClean="0"/>
+              <a:t>URL</a:t>
+            </a:r>
+            <a:endParaRPr lang="ko-KR" altLang="en-US" dirty="0"/>
+          </a:p>
+        </p:txBody>
+      </p:sp>
+      <p:sp>
+        <p:nvSpPr>
+          <p:cNvPr id="7" name="모서리가 둥근 직사각형 6"/>
+          <p:cNvSpPr/>
+          <p:nvPr/>
+        </p:nvSpPr>
+        <p:spPr>
+          <a:xfrm>
+            <a:off x="3830307" y="1232449"/>
+            <a:ext cx="874643" cy="461175"/>
+          </a:xfrm>
+          <a:prstGeom prst="roundRect">
+            <a:avLst/>
+          </a:prstGeom>
+        </p:spPr>
+        <p:style>
+          <a:lnRef idx="2">
+            <a:schemeClr val="accent1">
+              <a:shade val="50000"/>
+            </a:schemeClr>
+          </a:lnRef>
+          <a:fillRef idx="1">
+            <a:schemeClr val="accent1"/>
+          </a:fillRef>
+          <a:effectRef idx="0">
+            <a:schemeClr val="accent1"/>
+          </a:effectRef>
+          <a:fontRef idx="minor">
+            <a:schemeClr val="lt1"/>
+          </a:fontRef>
+        </p:style>
+        <p:txBody>
+          <a:bodyPr rtlCol="0" anchor="ctr"/>
+          <a:lstStyle/>
+          <a:p>
+            <a:pPr algn="ctr"/>
+            <a:r>
+              <a:rPr lang="en-US" altLang="ko-KR" dirty="0" smtClean="0"/>
+              <a:t>View</a:t>
+            </a:r>
+            <a:endParaRPr lang="ko-KR" altLang="en-US" dirty="0"/>
+          </a:p>
+        </p:txBody>
+      </p:sp>
+      <p:sp>
+        <p:nvSpPr>
+          <p:cNvPr id="8" name="모서리가 둥근 직사각형 7"/>
+          <p:cNvSpPr/>
+          <p:nvPr/>
+        </p:nvSpPr>
+        <p:spPr>
+          <a:xfrm>
+            <a:off x="6857532" y="1232449"/>
+            <a:ext cx="1197140" cy="461175"/>
+          </a:xfrm>
+          <a:prstGeom prst="roundRect">
+            <a:avLst/>
+          </a:prstGeom>
+        </p:spPr>
+        <p:style>
+          <a:lnRef idx="2">
+            <a:schemeClr val="accent1">
+              <a:shade val="50000"/>
+            </a:schemeClr>
+          </a:lnRef>
+          <a:fillRef idx="1">
+            <a:schemeClr val="accent1"/>
+          </a:fillRef>
+          <a:effectRef idx="0">
+            <a:schemeClr val="accent1"/>
+          </a:effectRef>
+          <a:fontRef idx="minor">
+            <a:schemeClr val="lt1"/>
+          </a:fontRef>
+        </p:style>
+        <p:txBody>
+          <a:bodyPr rtlCol="0" anchor="ctr"/>
+          <a:lstStyle/>
+          <a:p>
+            <a:pPr algn="ctr"/>
+            <a:r>
+              <a:rPr lang="en-US" altLang="ko-KR" dirty="0" smtClean="0"/>
+              <a:t>Template</a:t>
+            </a:r>
+            <a:endParaRPr lang="ko-KR" altLang="en-US" dirty="0"/>
+          </a:p>
+        </p:txBody>
+      </p:sp>
+      <p:cxnSp>
+        <p:nvCxnSpPr>
+          <p:cNvPr id="9" name="직선 연결선 8"/>
+          <p:cNvCxnSpPr/>
+          <p:nvPr/>
+        </p:nvCxnSpPr>
+        <p:spPr>
+          <a:xfrm>
+            <a:off x="2754016" y="1494841"/>
+            <a:ext cx="0" cy="3093057"/>
+          </a:xfrm>
+          <a:prstGeom prst="line">
+            <a:avLst/>
+          </a:prstGeom>
+          <a:ln>
+            <a:prstDash val="dash"/>
+          </a:ln>
+        </p:spPr>
+        <p:style>
+          <a:lnRef idx="1">
+            <a:schemeClr val="accent1"/>
+          </a:lnRef>
+          <a:fillRef idx="0">
+            <a:schemeClr val="accent1"/>
+          </a:fillRef>
+          <a:effectRef idx="0">
+            <a:schemeClr val="accent1"/>
+          </a:effectRef>
+          <a:fontRef idx="minor">
+            <a:schemeClr val="tx1"/>
+          </a:fontRef>
+        </p:style>
+      </p:cxnSp>
+      <p:cxnSp>
+        <p:nvCxnSpPr>
+          <p:cNvPr id="11" name="직선 연결선 10"/>
+          <p:cNvCxnSpPr/>
+          <p:nvPr/>
+        </p:nvCxnSpPr>
+        <p:spPr>
+          <a:xfrm>
+            <a:off x="5781241" y="1494841"/>
+            <a:ext cx="0" cy="3093057"/>
+          </a:xfrm>
+          <a:prstGeom prst="line">
+            <a:avLst/>
+          </a:prstGeom>
+          <a:ln>
+            <a:prstDash val="dash"/>
+          </a:ln>
+        </p:spPr>
+        <p:style>
+          <a:lnRef idx="1">
+            <a:schemeClr val="accent1"/>
+          </a:lnRef>
+          <a:fillRef idx="0">
+            <a:schemeClr val="accent1"/>
+          </a:fillRef>
+          <a:effectRef idx="0">
+            <a:schemeClr val="accent1"/>
+          </a:effectRef>
+          <a:fontRef idx="minor">
+            <a:schemeClr val="tx1"/>
+          </a:fontRef>
+        </p:style>
+      </p:cxnSp>
+      <p:grpSp>
+        <p:nvGrpSpPr>
+          <p:cNvPr id="1031" name="그룹 1030"/>
+          <p:cNvGrpSpPr/>
+          <p:nvPr/>
+        </p:nvGrpSpPr>
+        <p:grpSpPr>
+          <a:xfrm>
+            <a:off x="648152" y="1799317"/>
+            <a:ext cx="4385024" cy="458853"/>
+            <a:chOff x="648152" y="1799317"/>
+            <a:chExt cx="4385024" cy="458853"/>
+          </a:xfrm>
+        </p:grpSpPr>
+        <p:sp>
+          <p:nvSpPr>
+            <p:cNvPr id="12" name="타원 11"/>
+            <p:cNvSpPr/>
+            <p:nvPr/>
+          </p:nvSpPr>
+          <p:spPr>
+            <a:xfrm>
+              <a:off x="3474720" y="1956020"/>
+              <a:ext cx="1558456" cy="302150"/>
+            </a:xfrm>
+            <a:prstGeom prst="ellipse">
+              <a:avLst/>
+            </a:prstGeom>
+            <a:noFill/>
+          </p:spPr>
+          <p:style>
+            <a:lnRef idx="2">
+              <a:schemeClr val="accent1">
+                <a:shade val="50000"/>
+              </a:schemeClr>
+            </a:lnRef>
+            <a:fillRef idx="1">
+              <a:schemeClr val="accent1"/>
+            </a:fillRef>
+            <a:effectRef idx="0">
+              <a:schemeClr val="accent1"/>
+            </a:effectRef>
+            <a:fontRef idx="minor">
+              <a:schemeClr val="lt1"/>
+            </a:fontRef>
+          </p:style>
+          <p:txBody>
+            <a:bodyPr rtlCol="0" anchor="ctr"/>
+            <a:lstStyle/>
+            <a:p>
+              <a:pPr algn="ctr"/>
+              <a:r>
+                <a:rPr lang="en-US" altLang="ko-KR" dirty="0" smtClean="0">
+                  <a:ln w="0"/>
+                  <a:solidFill>
+                    <a:schemeClr val="tx1"/>
+                  </a:solidFill>
+                  <a:effectLst>
+                    <a:outerShdw blurRad="38100" dist="19050" dir="2700000" algn="tl" rotWithShape="0">
+                      <a:schemeClr val="dk1">
+                        <a:alpha val="40000"/>
+                      </a:schemeClr>
+                    </a:outerShdw>
+                  </a:effectLst>
+                </a:rPr>
+                <a:t>logout()</a:t>
+              </a:r>
+              <a:endParaRPr lang="ko-KR" altLang="en-US" dirty="0">
+                <a:ln w="0"/>
+                <a:solidFill>
+                  <a:schemeClr val="tx1"/>
+                </a:solidFill>
+                <a:effectLst>
+                  <a:outerShdw blurRad="38100" dist="19050" dir="2700000" algn="tl" rotWithShape="0">
+                    <a:schemeClr val="dk1">
+                      <a:alpha val="40000"/>
+                    </a:schemeClr>
+                  </a:outerShdw>
+                </a:effectLst>
+              </a:endParaRPr>
+            </a:p>
+          </p:txBody>
+        </p:sp>
+        <p:cxnSp>
+          <p:nvCxnSpPr>
+            <p:cNvPr id="23" name="직선 화살표 연결선 22"/>
+            <p:cNvCxnSpPr>
+              <a:endCxn id="12" idx="2"/>
+            </p:cNvCxnSpPr>
+            <p:nvPr/>
+          </p:nvCxnSpPr>
+          <p:spPr>
+            <a:xfrm>
+              <a:off x="691763" y="2107094"/>
+              <a:ext cx="2782957" cy="1"/>
+            </a:xfrm>
+            <a:prstGeom prst="straightConnector1">
+              <a:avLst/>
+            </a:prstGeom>
+            <a:ln>
+              <a:solidFill>
+                <a:schemeClr val="accent1"/>
+              </a:solidFill>
+              <a:tailEnd type="triangle"/>
+            </a:ln>
+          </p:spPr>
+          <p:style>
+            <a:lnRef idx="1">
+              <a:schemeClr val="accent1"/>
+            </a:lnRef>
+            <a:fillRef idx="0">
+              <a:schemeClr val="accent1"/>
+            </a:fillRef>
+            <a:effectRef idx="0">
+              <a:schemeClr val="accent1"/>
+            </a:effectRef>
+            <a:fontRef idx="minor">
+              <a:schemeClr val="tx1"/>
+            </a:fontRef>
+          </p:style>
+        </p:cxnSp>
+        <p:sp>
+          <p:nvSpPr>
+            <p:cNvPr id="43" name="TextBox 42"/>
+            <p:cNvSpPr txBox="1"/>
+            <p:nvPr/>
+          </p:nvSpPr>
+          <p:spPr>
+            <a:xfrm>
+              <a:off x="648152" y="1799317"/>
+              <a:ext cx="771365" cy="307777"/>
+            </a:xfrm>
+            <a:prstGeom prst="rect">
+              <a:avLst/>
+            </a:prstGeom>
+            <a:noFill/>
+          </p:spPr>
+          <p:txBody>
+            <a:bodyPr wrap="none" rtlCol="0">
+              <a:spAutoFit/>
+            </a:bodyPr>
+            <a:lstStyle/>
+            <a:p>
+              <a:r>
+                <a:rPr lang="en-US" altLang="ko-KR" dirty="0" smtClean="0"/>
+                <a:t>/</a:t>
+              </a:r>
+              <a:r>
+                <a:rPr lang="en-US" altLang="ko-KR" dirty="0" smtClean="0"/>
+                <a:t>logout/</a:t>
+              </a:r>
+              <a:endParaRPr lang="ko-KR" altLang="en-US" dirty="0"/>
+            </a:p>
+          </p:txBody>
+        </p:sp>
+      </p:grpSp>
+      <p:grpSp>
+        <p:nvGrpSpPr>
+          <p:cNvPr id="93" name="그룹 92"/>
+          <p:cNvGrpSpPr/>
+          <p:nvPr/>
+        </p:nvGrpSpPr>
+        <p:grpSpPr>
+          <a:xfrm>
+            <a:off x="691762" y="2107095"/>
+            <a:ext cx="7668912" cy="786326"/>
+            <a:chOff x="691762" y="3832227"/>
+            <a:chExt cx="7668912" cy="786326"/>
+          </a:xfrm>
+        </p:grpSpPr>
+        <p:grpSp>
+          <p:nvGrpSpPr>
+            <p:cNvPr id="94" name="그룹 93"/>
+            <p:cNvGrpSpPr/>
+            <p:nvPr/>
+          </p:nvGrpSpPr>
+          <p:grpSpPr>
+            <a:xfrm>
+              <a:off x="691762" y="3969302"/>
+              <a:ext cx="7668912" cy="649251"/>
+              <a:chOff x="648152" y="2413528"/>
+              <a:chExt cx="7668912" cy="649251"/>
+            </a:xfrm>
+          </p:grpSpPr>
+          <p:sp>
+            <p:nvSpPr>
+              <p:cNvPr id="97" name="모서리가 둥근 직사각형 96"/>
+              <p:cNvSpPr/>
+              <p:nvPr/>
+            </p:nvSpPr>
+            <p:spPr>
+              <a:xfrm>
+                <a:off x="6642847" y="2768581"/>
+                <a:ext cx="1674217" cy="294198"/>
+              </a:xfrm>
+              <a:prstGeom prst="roundRect">
+                <a:avLst/>
+              </a:prstGeom>
+              <a:noFill/>
+            </p:spPr>
+            <p:style>
+              <a:lnRef idx="2">
+                <a:schemeClr val="accent1">
+                  <a:shade val="50000"/>
+                </a:schemeClr>
+              </a:lnRef>
+              <a:fillRef idx="1">
+                <a:schemeClr val="accent1"/>
+              </a:fillRef>
+              <a:effectRef idx="0">
+                <a:schemeClr val="accent1"/>
+              </a:effectRef>
+              <a:fontRef idx="minor">
+                <a:schemeClr val="lt1"/>
+              </a:fontRef>
+            </p:style>
+            <p:txBody>
+              <a:bodyPr rtlCol="0" anchor="ctr"/>
+              <a:lstStyle/>
+              <a:p>
+                <a:pPr algn="ctr"/>
+                <a:r>
+                  <a:rPr lang="en-US" altLang="ko-KR" dirty="0" smtClean="0">
+                    <a:ln w="0"/>
+                    <a:solidFill>
+                      <a:schemeClr val="tx1"/>
+                    </a:solidFill>
+                    <a:effectLst>
+                      <a:outerShdw blurRad="38100" dist="19050" dir="2700000" algn="tl" rotWithShape="0">
+                        <a:schemeClr val="dk1">
+                          <a:alpha val="40000"/>
+                        </a:schemeClr>
+                      </a:outerShdw>
+                    </a:effectLst>
+                  </a:rPr>
+                  <a:t>/home/index.html</a:t>
+                </a:r>
+                <a:endParaRPr lang="ko-KR" altLang="en-US" dirty="0"/>
+              </a:p>
+            </p:txBody>
+          </p:sp>
+          <p:sp>
+            <p:nvSpPr>
+              <p:cNvPr id="98" name="타원 97"/>
+              <p:cNvSpPr/>
+              <p:nvPr/>
+            </p:nvSpPr>
+            <p:spPr>
+              <a:xfrm>
+                <a:off x="3474720" y="2751150"/>
+                <a:ext cx="1558456" cy="302150"/>
+              </a:xfrm>
+              <a:prstGeom prst="ellipse">
+                <a:avLst/>
+              </a:prstGeom>
+              <a:noFill/>
+            </p:spPr>
+            <p:style>
+              <a:lnRef idx="2">
+                <a:schemeClr val="accent1">
+                  <a:shade val="50000"/>
+                </a:schemeClr>
+              </a:lnRef>
+              <a:fillRef idx="1">
+                <a:schemeClr val="accent1"/>
+              </a:fillRef>
+              <a:effectRef idx="0">
+                <a:schemeClr val="accent1"/>
+              </a:effectRef>
+              <a:fontRef idx="minor">
+                <a:schemeClr val="lt1"/>
+              </a:fontRef>
+            </p:style>
+            <p:txBody>
+              <a:bodyPr rtlCol="0" anchor="ctr"/>
+              <a:lstStyle/>
+              <a:p>
+                <a:pPr algn="ctr"/>
+                <a:r>
+                  <a:rPr lang="en-US" altLang="ko-KR" dirty="0" smtClean="0">
+                    <a:ln w="0"/>
+                    <a:solidFill>
+                      <a:schemeClr val="tx1"/>
+                    </a:solidFill>
+                    <a:effectLst>
+                      <a:outerShdw blurRad="38100" dist="19050" dir="2700000" algn="tl" rotWithShape="0">
+                        <a:schemeClr val="dk1">
+                          <a:alpha val="40000"/>
+                        </a:schemeClr>
+                      </a:outerShdw>
+                    </a:effectLst>
+                  </a:rPr>
+                  <a:t>index()</a:t>
+                </a:r>
+                <a:endParaRPr lang="ko-KR" altLang="en-US" dirty="0">
+                  <a:ln w="0"/>
+                  <a:solidFill>
+                    <a:schemeClr val="tx1"/>
+                  </a:solidFill>
+                  <a:effectLst>
+                    <a:outerShdw blurRad="38100" dist="19050" dir="2700000" algn="tl" rotWithShape="0">
+                      <a:schemeClr val="dk1">
+                        <a:alpha val="40000"/>
+                      </a:schemeClr>
+                    </a:outerShdw>
+                  </a:effectLst>
+                </a:endParaRPr>
+              </a:p>
+            </p:txBody>
+          </p:sp>
+          <p:sp>
+            <p:nvSpPr>
+              <p:cNvPr id="99" name="TextBox 98"/>
+              <p:cNvSpPr txBox="1"/>
+              <p:nvPr/>
+            </p:nvSpPr>
+            <p:spPr>
+              <a:xfrm>
+                <a:off x="648152" y="2629064"/>
+                <a:ext cx="731290" cy="307777"/>
+              </a:xfrm>
+              <a:prstGeom prst="rect">
+                <a:avLst/>
+              </a:prstGeom>
+              <a:noFill/>
+            </p:spPr>
+            <p:txBody>
+              <a:bodyPr wrap="none" rtlCol="0">
+                <a:spAutoFit/>
+              </a:bodyPr>
+              <a:lstStyle/>
+              <a:p>
+                <a:r>
+                  <a:rPr lang="en-US" altLang="ko-KR" dirty="0" smtClean="0"/>
+                  <a:t>/home/</a:t>
+                </a:r>
+                <a:endParaRPr lang="ko-KR" altLang="en-US" dirty="0"/>
+              </a:p>
+            </p:txBody>
+          </p:sp>
+          <p:cxnSp>
+            <p:nvCxnSpPr>
+              <p:cNvPr id="100" name="직선 화살표 연결선 99"/>
+              <p:cNvCxnSpPr>
+                <a:endCxn id="98" idx="2"/>
+              </p:cNvCxnSpPr>
+              <p:nvPr/>
+            </p:nvCxnSpPr>
+            <p:spPr>
+              <a:xfrm>
+                <a:off x="691762" y="2894272"/>
+                <a:ext cx="2782958" cy="7953"/>
+              </a:xfrm>
+              <a:prstGeom prst="straightConnector1">
+                <a:avLst/>
+              </a:prstGeom>
+              <a:ln>
+                <a:solidFill>
+                  <a:schemeClr val="accent1"/>
+                </a:solidFill>
+                <a:tailEnd type="triangle"/>
+              </a:ln>
+            </p:spPr>
+            <p:style>
+              <a:lnRef idx="1">
+                <a:schemeClr val="accent1"/>
+              </a:lnRef>
+              <a:fillRef idx="0">
+                <a:schemeClr val="accent1"/>
+              </a:fillRef>
+              <a:effectRef idx="0">
+                <a:schemeClr val="accent1"/>
+              </a:effectRef>
+              <a:fontRef idx="minor">
+                <a:schemeClr val="tx1"/>
+              </a:fontRef>
+            </p:style>
+          </p:cxnSp>
+          <p:cxnSp>
+            <p:nvCxnSpPr>
+              <p:cNvPr id="101" name="직선 화살표 연결선 100"/>
+              <p:cNvCxnSpPr>
+                <a:stCxn id="98" idx="6"/>
+                <a:endCxn id="97" idx="1"/>
+              </p:cNvCxnSpPr>
+              <p:nvPr/>
+            </p:nvCxnSpPr>
+            <p:spPr>
+              <a:xfrm>
+                <a:off x="5033176" y="2902225"/>
+                <a:ext cx="1609671" cy="13455"/>
+              </a:xfrm>
+              <a:prstGeom prst="straightConnector1">
+                <a:avLst/>
+              </a:prstGeom>
+              <a:ln>
+                <a:solidFill>
+                  <a:schemeClr val="accent1"/>
+                </a:solidFill>
+                <a:tailEnd type="triangle"/>
+              </a:ln>
+            </p:spPr>
+            <p:style>
+              <a:lnRef idx="1">
+                <a:schemeClr val="accent1"/>
+              </a:lnRef>
+              <a:fillRef idx="0">
+                <a:schemeClr val="accent1"/>
+              </a:fillRef>
+              <a:effectRef idx="0">
+                <a:schemeClr val="accent1"/>
+              </a:effectRef>
+              <a:fontRef idx="minor">
+                <a:schemeClr val="tx1"/>
+              </a:fontRef>
+            </p:style>
+          </p:cxnSp>
+          <p:sp>
+            <p:nvSpPr>
+              <p:cNvPr id="102" name="TextBox 101"/>
+              <p:cNvSpPr txBox="1"/>
+              <p:nvPr/>
+            </p:nvSpPr>
+            <p:spPr>
+              <a:xfrm>
+                <a:off x="3888303" y="2413528"/>
+                <a:ext cx="780983" cy="307777"/>
+              </a:xfrm>
+              <a:prstGeom prst="rect">
+                <a:avLst/>
+              </a:prstGeom>
+              <a:noFill/>
+            </p:spPr>
+            <p:txBody>
+              <a:bodyPr wrap="none" rtlCol="0">
+                <a:spAutoFit/>
+              </a:bodyPr>
+              <a:lstStyle/>
+              <a:p>
+                <a:r>
+                  <a:rPr lang="en-US" altLang="ko-KR" dirty="0" smtClean="0"/>
+                  <a:t>redirect</a:t>
+                </a:r>
+                <a:endParaRPr lang="ko-KR" altLang="en-US" dirty="0"/>
+              </a:p>
+            </p:txBody>
+          </p:sp>
+        </p:grpSp>
+        <p:cxnSp>
+          <p:nvCxnSpPr>
+            <p:cNvPr id="95" name="꺾인 연결선 94"/>
+            <p:cNvCxnSpPr>
+              <a:stCxn id="12" idx="6"/>
+            </p:cNvCxnSpPr>
+            <p:nvPr/>
+          </p:nvCxnSpPr>
+          <p:spPr>
+            <a:xfrm flipH="1">
+              <a:off x="735372" y="3832227"/>
+              <a:ext cx="4297804" cy="360467"/>
+            </a:xfrm>
+            <a:prstGeom prst="bentConnector3">
+              <a:avLst>
+                <a:gd name="adj1" fmla="val -5319"/>
+              </a:avLst>
+            </a:prstGeom>
+          </p:spPr>
+          <p:style>
+            <a:lnRef idx="1">
+              <a:schemeClr val="accent1"/>
+            </a:lnRef>
+            <a:fillRef idx="0">
+              <a:schemeClr val="accent1"/>
+            </a:fillRef>
+            <a:effectRef idx="0">
+              <a:schemeClr val="accent1"/>
+            </a:effectRef>
+            <a:fontRef idx="minor">
+              <a:schemeClr val="tx1"/>
+            </a:fontRef>
+          </p:style>
+        </p:cxnSp>
+        <p:cxnSp>
+          <p:nvCxnSpPr>
+            <p:cNvPr id="96" name="직선 연결선 95"/>
+            <p:cNvCxnSpPr/>
+            <p:nvPr/>
+          </p:nvCxnSpPr>
+          <p:spPr>
+            <a:xfrm>
+              <a:off x="735372" y="4192694"/>
+              <a:ext cx="0" cy="265305"/>
+            </a:xfrm>
+            <a:prstGeom prst="line">
+              <a:avLst/>
+            </a:prstGeom>
+          </p:spPr>
+          <p:style>
+            <a:lnRef idx="1">
+              <a:schemeClr val="accent1"/>
+            </a:lnRef>
+            <a:fillRef idx="0">
+              <a:schemeClr val="accent1"/>
+            </a:fillRef>
+            <a:effectRef idx="0">
+              <a:schemeClr val="accent1"/>
+            </a:effectRef>
+            <a:fontRef idx="minor">
+              <a:schemeClr val="tx1"/>
+            </a:fontRef>
+          </p:style>
+        </p:cxnSp>
+      </p:grpSp>
+    </p:spTree>
+    <p:extLst>
+      <p:ext uri="{BB962C8B-B14F-4D97-AF65-F5344CB8AC3E}">
+        <p14:creationId xmlns:p14="http://schemas.microsoft.com/office/powerpoint/2010/main" val="110914464"/>
       </p:ext>
     </p:extLst>
   </p:cSld>

</xml_diff>